<commit_message>
Add Phase transition results
</commit_message>
<xml_diff>
--- a/Code/Results/Result_RQ0/Zheng.pptx
+++ b/Code/Results/Result_RQ0/Zheng.pptx
@@ -5,12 +5,13 @@
     <p:sldMasterId id="2147483648" r:id="rId1"/>
   </p:sldMasterIdLst>
   <p:notesMasterIdLst>
-    <p:notesMasterId r:id="rId5"/>
+    <p:notesMasterId r:id="rId6"/>
   </p:notesMasterIdLst>
   <p:sldIdLst>
     <p:sldId id="256" r:id="rId2"/>
     <p:sldId id="257" r:id="rId3"/>
     <p:sldId id="258" r:id="rId4"/>
+    <p:sldId id="259" r:id="rId5"/>
   </p:sldIdLst>
   <p:sldSz cx="12192000" cy="6858000"/>
   <p:notesSz cx="6858000" cy="9144000"/>
@@ -109,6 +110,11 @@
       </a:defRPr>
     </a:lvl9pPr>
   </p:defaultTextStyle>
+  <p:extLst>
+    <p:ext uri="{EFAFB233-063F-42B5-8137-9DF3F51BA10A}">
+      <p15:sldGuideLst xmlns:p15="http://schemas.microsoft.com/office/powerpoint/2012/main"/>
+    </p:ext>
+  </p:extLst>
 </p:presentation>
 </file>
 
@@ -946,6 +952,176 @@
     <p:extLst>
       <p:ext uri="{BB962C8B-B14F-4D97-AF65-F5344CB8AC3E}">
         <p14:creationId xmlns:p14="http://schemas.microsoft.com/office/powerpoint/2010/main" val="3355145451"/>
+      </p:ext>
+    </p:extLst>
+  </p:cSld>
+  <p:clrMapOvr>
+    <a:masterClrMapping/>
+  </p:clrMapOvr>
+</p:notes>
+</file>
+
+<file path=ppt/notesSlides/notesSlide4.xml><?xml version="1.0" encoding="utf-8"?>
+<p:notes xmlns:a="http://schemas.openxmlformats.org/drawingml/2006/main" xmlns:r="http://schemas.openxmlformats.org/officeDocument/2006/relationships" xmlns:p="http://schemas.openxmlformats.org/presentationml/2006/main">
+  <p:cSld>
+    <p:spTree>
+      <p:nvGrpSpPr>
+        <p:cNvPr id="1" name=""/>
+        <p:cNvGrpSpPr/>
+        <p:nvPr/>
+      </p:nvGrpSpPr>
+      <p:grpSpPr>
+        <a:xfrm>
+          <a:off x="0" y="0"/>
+          <a:ext cx="0" cy="0"/>
+          <a:chOff x="0" y="0"/>
+          <a:chExt cx="0" cy="0"/>
+        </a:xfrm>
+      </p:grpSpPr>
+      <p:sp>
+        <p:nvSpPr>
+          <p:cNvPr id="2" name="幻灯片图像占位符 1"/>
+          <p:cNvSpPr>
+            <a:spLocks noGrp="1" noRot="1" noChangeAspect="1"/>
+          </p:cNvSpPr>
+          <p:nvPr>
+            <p:ph type="sldImg"/>
+          </p:nvPr>
+        </p:nvSpPr>
+        <p:spPr/>
+      </p:sp>
+      <p:sp>
+        <p:nvSpPr>
+          <p:cNvPr id="3" name="备注占位符 2"/>
+          <p:cNvSpPr>
+            <a:spLocks noGrp="1"/>
+          </p:cNvSpPr>
+          <p:nvPr>
+            <p:ph type="body" idx="1"/>
+          </p:nvPr>
+        </p:nvSpPr>
+        <p:spPr/>
+        <p:txBody>
+          <a:bodyPr/>
+          <a:lstStyle/>
+          <a:p>
+            <a:r>
+              <a:rPr lang="en-US" altLang="zh-CN" dirty="0"/>
+              <a:t>We observe a sharp drop in </a:t>
+            </a:r>
+            <a:r>
+              <a:rPr lang="en-US" altLang="zh-CN" dirty="0" err="1"/>
+              <a:t>Pr</a:t>
+            </a:r>
+            <a:r>
+              <a:rPr lang="en-US" altLang="zh-CN" dirty="0"/>
+              <a:t>(all-D) over a narrow </a:t>
+            </a:r>
+            <a:r>
+              <a:rPr lang="el-GR" altLang="zh-CN" dirty="0"/>
+              <a:t>β-</a:t>
+            </a:r>
+            <a:r>
+              <a:rPr lang="en-US" altLang="zh-CN" dirty="0"/>
+              <a:t>interval, and the maximum slope magnitude increases from N=100 to N=900, consistent with finite-size sharpening.</a:t>
+            </a:r>
+          </a:p>
+          <a:p>
+            <a:r>
+              <a:rPr lang="en-US" altLang="zh-CN" dirty="0"/>
+              <a:t>Under Imitation, WS networks show a sharp drop in the probability of all-D fixation, and this drop becomes steeper as N increases—behavior consistent with a finite-size phase transition (absorbing all-D → active/non-absorbed regime).</a:t>
+            </a:r>
+          </a:p>
+          <a:p>
+            <a:endParaRPr lang="en-US" altLang="zh-CN" dirty="0"/>
+          </a:p>
+          <a:p>
+            <a:r>
+              <a:rPr lang="en-US" altLang="zh-CN" b="1" dirty="0"/>
+              <a:t>Grid shows the same qualitative behavior</a:t>
+            </a:r>
+            <a:r>
+              <a:rPr lang="en-US" altLang="zh-CN" dirty="0"/>
+              <a:t>—a sharp decrease in </a:t>
+            </a:r>
+            <a:r>
+              <a:rPr lang="en-US" altLang="zh-CN" dirty="0" err="1"/>
+              <a:t>Pr</a:t>
+            </a:r>
+            <a:r>
+              <a:rPr lang="en-US" altLang="zh-CN" dirty="0"/>
+              <a:t>(all-D)over a relatively narrow </a:t>
+            </a:r>
+            <a:r>
+              <a:rPr lang="el-GR" altLang="zh-CN" dirty="0"/>
+              <a:t>β </a:t>
+            </a:r>
+            <a:r>
+              <a:rPr lang="en-US" altLang="zh-CN" dirty="0"/>
+              <a:t>range—</a:t>
+            </a:r>
+            <a:r>
+              <a:rPr lang="en-US" altLang="zh-CN" b="1" dirty="0"/>
+              <a:t>suggesting a similar transition-like crossover</a:t>
+            </a:r>
+            <a:r>
+              <a:rPr lang="en-US" altLang="zh-CN" dirty="0"/>
+              <a:t>.</a:t>
+            </a:r>
+            <a:br>
+              <a:rPr lang="en-US" altLang="zh-CN" dirty="0"/>
+            </a:br>
+            <a:r>
+              <a:rPr lang="en-US" altLang="zh-CN" dirty="0"/>
+              <a:t>However, </a:t>
+            </a:r>
+            <a:r>
+              <a:rPr lang="en-US" altLang="zh-CN" b="1" dirty="0"/>
+              <a:t>the estimated transition location varies more across the grid sizes we tested</a:t>
+            </a:r>
+            <a:r>
+              <a:rPr lang="en-US" altLang="zh-CN" dirty="0"/>
+              <a:t>, so we treat the Grid evidence as </a:t>
+            </a:r>
+            <a:r>
+              <a:rPr lang="en-US" altLang="zh-CN" b="1" dirty="0"/>
+              <a:t>preliminary</a:t>
+            </a:r>
+            <a:r>
+              <a:rPr lang="en-US" altLang="zh-CN" dirty="0"/>
+              <a:t> compared with the clearer finite-size sharpening observed in WS.</a:t>
+            </a:r>
+            <a:endParaRPr kumimoji="1" lang="zh-CN" altLang="en-US" dirty="0"/>
+          </a:p>
+        </p:txBody>
+      </p:sp>
+      <p:sp>
+        <p:nvSpPr>
+          <p:cNvPr id="4" name="灯片编号占位符 3"/>
+          <p:cNvSpPr>
+            <a:spLocks noGrp="1"/>
+          </p:cNvSpPr>
+          <p:nvPr>
+            <p:ph type="sldNum" sz="quarter" idx="5"/>
+          </p:nvPr>
+        </p:nvSpPr>
+        <p:spPr/>
+        <p:txBody>
+          <a:bodyPr/>
+          <a:lstStyle/>
+          <a:p>
+            <a:fld id="{23444E9F-FF75-E141-8C23-7B1E5DA8CBCD}" type="slidenum">
+              <a:rPr kumimoji="1" lang="zh-CN" altLang="en-US" smtClean="0"/>
+              <a:t>4</a:t>
+            </a:fld>
+            <a:endParaRPr kumimoji="1" lang="zh-CN" altLang="en-US"/>
+          </a:p>
+        </p:txBody>
+      </p:sp>
+    </p:spTree>
+    <p:extLst>
+      <p:ext uri="{BB962C8B-B14F-4D97-AF65-F5344CB8AC3E}">
+        <p14:creationId xmlns:p14="http://schemas.microsoft.com/office/powerpoint/2010/main" val="3043331606"/>
       </p:ext>
     </p:extLst>
   </p:cSld>
@@ -4755,6 +4931,1381 @@
     <p:extLst>
       <p:ext uri="{BB962C8B-B14F-4D97-AF65-F5344CB8AC3E}">
         <p14:creationId xmlns:p14="http://schemas.microsoft.com/office/powerpoint/2010/main" val="1997027080"/>
+      </p:ext>
+    </p:extLst>
+  </p:cSld>
+  <p:clrMapOvr>
+    <a:masterClrMapping/>
+  </p:clrMapOvr>
+</p:sld>
+</file>
+
+<file path=ppt/slides/slide4.xml><?xml version="1.0" encoding="utf-8"?>
+<p:sld xmlns:a="http://schemas.openxmlformats.org/drawingml/2006/main" xmlns:r="http://schemas.openxmlformats.org/officeDocument/2006/relationships" xmlns:p="http://schemas.openxmlformats.org/presentationml/2006/main">
+  <p:cSld>
+    <p:spTree>
+      <p:nvGrpSpPr>
+        <p:cNvPr id="1" name=""/>
+        <p:cNvGrpSpPr/>
+        <p:nvPr/>
+      </p:nvGrpSpPr>
+      <p:grpSpPr>
+        <a:xfrm>
+          <a:off x="0" y="0"/>
+          <a:ext cx="0" cy="0"/>
+          <a:chOff x="0" y="0"/>
+          <a:chExt cx="0" cy="0"/>
+        </a:xfrm>
+      </p:grpSpPr>
+      <p:graphicFrame>
+        <p:nvGraphicFramePr>
+          <p:cNvPr id="4" name="表格 3">
+            <a:extLst>
+              <a:ext uri="{FF2B5EF4-FFF2-40B4-BE49-F238E27FC236}">
+                <a16:creationId xmlns:a16="http://schemas.microsoft.com/office/drawing/2014/main" id="{EE87E50B-866C-C722-B814-FCC5578E53C1}"/>
+              </a:ext>
+            </a:extLst>
+          </p:cNvPr>
+          <p:cNvGraphicFramePr>
+            <a:graphicFrameLocks noGrp="1"/>
+          </p:cNvGraphicFramePr>
+          <p:nvPr>
+            <p:extLst>
+              <p:ext uri="{D42A27DB-BD31-4B8C-83A1-F6EECF244321}">
+                <p14:modId xmlns:p14="http://schemas.microsoft.com/office/powerpoint/2010/main" val="2765252326"/>
+              </p:ext>
+            </p:extLst>
+          </p:nvPr>
+        </p:nvGraphicFramePr>
+        <p:xfrm>
+          <a:off x="2774313" y="4543958"/>
+          <a:ext cx="6515099" cy="1122824"/>
+        </p:xfrm>
+        <a:graphic>
+          <a:graphicData uri="http://schemas.openxmlformats.org/drawingml/2006/table">
+            <a:tbl>
+              <a:tblPr firstRow="1" bandRow="1">
+                <a:tableStyleId>{5C22544A-7EE6-4342-B048-85BDC9FD1C3A}</a:tableStyleId>
+              </a:tblPr>
+              <a:tblGrid>
+                <a:gridCol w="902642">
+                  <a:extLst>
+                    <a:ext uri="{9D8B030D-6E8A-4147-A177-3AD203B41FA5}">
+                      <a16:colId xmlns:a16="http://schemas.microsoft.com/office/drawing/2014/main" val="2569558677"/>
+                    </a:ext>
+                  </a:extLst>
+                </a:gridCol>
+                <a:gridCol w="1751659">
+                  <a:extLst>
+                    <a:ext uri="{9D8B030D-6E8A-4147-A177-3AD203B41FA5}">
+                      <a16:colId xmlns:a16="http://schemas.microsoft.com/office/drawing/2014/main" val="3125625566"/>
+                    </a:ext>
+                  </a:extLst>
+                </a:gridCol>
+                <a:gridCol w="1000948">
+                  <a:extLst>
+                    <a:ext uri="{9D8B030D-6E8A-4147-A177-3AD203B41FA5}">
+                      <a16:colId xmlns:a16="http://schemas.microsoft.com/office/drawing/2014/main" val="3489800992"/>
+                    </a:ext>
+                  </a:extLst>
+                </a:gridCol>
+                <a:gridCol w="1429925">
+                  <a:extLst>
+                    <a:ext uri="{9D8B030D-6E8A-4147-A177-3AD203B41FA5}">
+                      <a16:colId xmlns:a16="http://schemas.microsoft.com/office/drawing/2014/main" val="1805364633"/>
+                    </a:ext>
+                  </a:extLst>
+                </a:gridCol>
+                <a:gridCol w="1429925">
+                  <a:extLst>
+                    <a:ext uri="{9D8B030D-6E8A-4147-A177-3AD203B41FA5}">
+                      <a16:colId xmlns:a16="http://schemas.microsoft.com/office/drawing/2014/main" val="2271048523"/>
+                    </a:ext>
+                  </a:extLst>
+                </a:gridCol>
+              </a:tblGrid>
+              <a:tr h="275286">
+                <a:tc>
+                  <a:txBody>
+                    <a:bodyPr/>
+                    <a:lstStyle/>
+                    <a:p>
+                      <a:r>
+                        <a:rPr lang="en-US" altLang="zh-CN" sz="1300" dirty="0">
+                          <a:latin typeface="Calibri" panose="020F0502020204030204" pitchFamily="34" charset="0"/>
+                          <a:cs typeface="Calibri" panose="020F0502020204030204" pitchFamily="34" charset="0"/>
+                        </a:rPr>
+                        <a:t>Grid </a:t>
+                      </a:r>
+                      <a:endParaRPr lang="zh-CN" altLang="en-US" sz="1300" dirty="0">
+                        <a:latin typeface="Calibri" panose="020F0502020204030204" pitchFamily="34" charset="0"/>
+                        <a:cs typeface="Calibri" panose="020F0502020204030204" pitchFamily="34" charset="0"/>
+                      </a:endParaRPr>
+                    </a:p>
+                  </a:txBody>
+                  <a:tcPr marL="82586" marR="82586" marT="41293" marB="41293"/>
+                </a:tc>
+                <a:tc>
+                  <a:txBody>
+                    <a:bodyPr/>
+                    <a:lstStyle/>
+                    <a:p>
+                      <a:pPr marL="0" algn="l" defTabSz="914400" rtl="0" eaLnBrk="1" latinLnBrk="0" hangingPunct="1"/>
+                      <a:r>
+                        <a:rPr lang="en-US" altLang="zh-CN" sz="1300" b="1" kern="1200" dirty="0">
+                          <a:solidFill>
+                            <a:schemeClr val="lt1"/>
+                          </a:solidFill>
+                          <a:latin typeface="Calibri" panose="020F0502020204030204" pitchFamily="34" charset="0"/>
+                          <a:ea typeface="+mn-ea"/>
+                          <a:cs typeface="Calibri" panose="020F0502020204030204" pitchFamily="34" charset="0"/>
+                        </a:rPr>
+                        <a:t>beta*(max |</a:t>
+                      </a:r>
+                      <a:r>
+                        <a:rPr lang="en-US" altLang="zh-CN" sz="1300" b="1" kern="1200" dirty="0" err="1">
+                          <a:solidFill>
+                            <a:schemeClr val="lt1"/>
+                          </a:solidFill>
+                          <a:latin typeface="Calibri" panose="020F0502020204030204" pitchFamily="34" charset="0"/>
+                          <a:ea typeface="+mn-ea"/>
+                          <a:cs typeface="Calibri" panose="020F0502020204030204" pitchFamily="34" charset="0"/>
+                        </a:rPr>
+                        <a:t>dPr-allD</a:t>
+                      </a:r>
+                      <a:r>
+                        <a:rPr lang="en-US" altLang="zh-CN" sz="1300" b="1" kern="1200" dirty="0">
+                          <a:solidFill>
+                            <a:schemeClr val="lt1"/>
+                          </a:solidFill>
+                          <a:latin typeface="Calibri" panose="020F0502020204030204" pitchFamily="34" charset="0"/>
+                          <a:ea typeface="+mn-ea"/>
+                          <a:cs typeface="Calibri" panose="020F0502020204030204" pitchFamily="34" charset="0"/>
+                        </a:rPr>
+                        <a:t>|)</a:t>
+                      </a:r>
+                      <a:endParaRPr lang="zh-CN" altLang="en-US" sz="1300" b="1" kern="1200" dirty="0">
+                        <a:solidFill>
+                          <a:schemeClr val="lt1"/>
+                        </a:solidFill>
+                        <a:latin typeface="Calibri" panose="020F0502020204030204" pitchFamily="34" charset="0"/>
+                        <a:ea typeface="+mn-ea"/>
+                        <a:cs typeface="Calibri" panose="020F0502020204030204" pitchFamily="34" charset="0"/>
+                      </a:endParaRPr>
+                    </a:p>
+                  </a:txBody>
+                  <a:tcPr marL="82586" marR="82586" marT="41293" marB="41293"/>
+                </a:tc>
+                <a:tc>
+                  <a:txBody>
+                    <a:bodyPr/>
+                    <a:lstStyle/>
+                    <a:p>
+                      <a:r>
+                        <a:rPr lang="en-US" altLang="zh-CN" sz="1300" dirty="0">
+                          <a:latin typeface="Calibri" panose="020F0502020204030204" pitchFamily="34" charset="0"/>
+                          <a:cs typeface="Calibri" panose="020F0502020204030204" pitchFamily="34" charset="0"/>
+                        </a:rPr>
+                        <a:t>max slope</a:t>
+                      </a:r>
+                      <a:endParaRPr lang="zh-CN" altLang="en-US" sz="1300" dirty="0">
+                        <a:latin typeface="Calibri" panose="020F0502020204030204" pitchFamily="34" charset="0"/>
+                        <a:cs typeface="Calibri" panose="020F0502020204030204" pitchFamily="34" charset="0"/>
+                      </a:endParaRPr>
+                    </a:p>
+                  </a:txBody>
+                  <a:tcPr marL="82586" marR="82586" marT="41293" marB="41293"/>
+                </a:tc>
+                <a:tc>
+                  <a:txBody>
+                    <a:bodyPr/>
+                    <a:lstStyle/>
+                    <a:p>
+                      <a:r>
+                        <a:rPr lang="en-US" altLang="zh-CN" sz="1300" b="1" kern="1200" dirty="0">
+                          <a:solidFill>
+                            <a:schemeClr val="lt1"/>
+                          </a:solidFill>
+                          <a:latin typeface="Calibri" panose="020F0502020204030204" pitchFamily="34" charset="0"/>
+                          <a:ea typeface="+mn-ea"/>
+                          <a:cs typeface="Calibri" panose="020F0502020204030204" pitchFamily="34" charset="0"/>
+                        </a:rPr>
+                        <a:t>beta*(max </a:t>
+                      </a:r>
+                      <a:r>
+                        <a:rPr lang="en-US" altLang="zh-CN" sz="1300" b="1" kern="1200" dirty="0" err="1">
+                          <a:solidFill>
+                            <a:schemeClr val="lt1"/>
+                          </a:solidFill>
+                          <a:latin typeface="Calibri" panose="020F0502020204030204" pitchFamily="34" charset="0"/>
+                          <a:ea typeface="+mn-ea"/>
+                          <a:cs typeface="Calibri" panose="020F0502020204030204" pitchFamily="34" charset="0"/>
+                        </a:rPr>
+                        <a:t>chiD</a:t>
+                      </a:r>
+                      <a:r>
+                        <a:rPr lang="en-US" altLang="zh-CN" sz="1300" b="1" kern="1200" dirty="0">
+                          <a:solidFill>
+                            <a:schemeClr val="lt1"/>
+                          </a:solidFill>
+                          <a:latin typeface="Calibri" panose="020F0502020204030204" pitchFamily="34" charset="0"/>
+                          <a:ea typeface="+mn-ea"/>
+                          <a:cs typeface="Calibri" panose="020F0502020204030204" pitchFamily="34" charset="0"/>
+                        </a:rPr>
+                        <a:t>)</a:t>
+                      </a:r>
+                      <a:endParaRPr lang="zh-CN" altLang="en-US" sz="1300" b="1" kern="1200" dirty="0">
+                        <a:solidFill>
+                          <a:schemeClr val="lt1"/>
+                        </a:solidFill>
+                        <a:latin typeface="Calibri" panose="020F0502020204030204" pitchFamily="34" charset="0"/>
+                        <a:ea typeface="+mn-ea"/>
+                        <a:cs typeface="Calibri" panose="020F0502020204030204" pitchFamily="34" charset="0"/>
+                      </a:endParaRPr>
+                    </a:p>
+                  </a:txBody>
+                  <a:tcPr marL="82586" marR="82586" marT="41293" marB="41293"/>
+                </a:tc>
+                <a:tc>
+                  <a:txBody>
+                    <a:bodyPr/>
+                    <a:lstStyle/>
+                    <a:p>
+                      <a:pPr marL="0" algn="l" defTabSz="914400" rtl="0" eaLnBrk="1" latinLnBrk="0" hangingPunct="1"/>
+                      <a:r>
+                        <a:rPr lang="en-US" altLang="zh-CN" sz="1300" b="1" kern="1200" dirty="0" err="1">
+                          <a:solidFill>
+                            <a:schemeClr val="lt1"/>
+                          </a:solidFill>
+                          <a:latin typeface="Calibri" panose="020F0502020204030204" pitchFamily="34" charset="0"/>
+                          <a:ea typeface="+mn-ea"/>
+                          <a:cs typeface="Calibri" panose="020F0502020204030204" pitchFamily="34" charset="0"/>
+                        </a:rPr>
+                        <a:t>chiD</a:t>
+                      </a:r>
+                      <a:endParaRPr lang="zh-CN" altLang="en-US" sz="1300" b="1" kern="1200" dirty="0">
+                        <a:solidFill>
+                          <a:schemeClr val="lt1"/>
+                        </a:solidFill>
+                        <a:latin typeface="Calibri" panose="020F0502020204030204" pitchFamily="34" charset="0"/>
+                        <a:ea typeface="+mn-ea"/>
+                        <a:cs typeface="Calibri" panose="020F0502020204030204" pitchFamily="34" charset="0"/>
+                      </a:endParaRPr>
+                    </a:p>
+                  </a:txBody>
+                  <a:tcPr marL="82586" marR="82586" marT="41293" marB="41293"/>
+                </a:tc>
+                <a:extLst>
+                  <a:ext uri="{0D108BD9-81ED-4DB2-BD59-A6C34878D82A}">
+                    <a16:rowId xmlns:a16="http://schemas.microsoft.com/office/drawing/2014/main" val="2555554977"/>
+                  </a:ext>
+                </a:extLst>
+              </a:tr>
+              <a:tr h="275286">
+                <a:tc>
+                  <a:txBody>
+                    <a:bodyPr/>
+                    <a:lstStyle/>
+                    <a:p>
+                      <a:r>
+                        <a:rPr lang="en-US" altLang="zh-CN" sz="1300" dirty="0">
+                          <a:latin typeface="Calibri" panose="020F0502020204030204" pitchFamily="34" charset="0"/>
+                          <a:cs typeface="Calibri" panose="020F0502020204030204" pitchFamily="34" charset="0"/>
+                        </a:rPr>
+                        <a:t>10*10</a:t>
+                      </a:r>
+                      <a:endParaRPr lang="zh-CN" altLang="en-US" sz="1300" dirty="0">
+                        <a:latin typeface="Calibri" panose="020F0502020204030204" pitchFamily="34" charset="0"/>
+                        <a:cs typeface="Calibri" panose="020F0502020204030204" pitchFamily="34" charset="0"/>
+                      </a:endParaRPr>
+                    </a:p>
+                  </a:txBody>
+                  <a:tcPr marL="82586" marR="82586" marT="41293" marB="41293"/>
+                </a:tc>
+                <a:tc>
+                  <a:txBody>
+                    <a:bodyPr/>
+                    <a:lstStyle/>
+                    <a:p>
+                      <a:r>
+                        <a:rPr lang="en-US" altLang="zh-CN" sz="1300" dirty="0">
+                          <a:latin typeface="Calibri" panose="020F0502020204030204" pitchFamily="34" charset="0"/>
+                          <a:cs typeface="Calibri" panose="020F0502020204030204" pitchFamily="34" charset="0"/>
+                        </a:rPr>
+                        <a:t>2.75</a:t>
+                      </a:r>
+                      <a:endParaRPr lang="zh-CN" altLang="en-US" sz="1300" dirty="0">
+                        <a:latin typeface="Calibri" panose="020F0502020204030204" pitchFamily="34" charset="0"/>
+                        <a:cs typeface="Calibri" panose="020F0502020204030204" pitchFamily="34" charset="0"/>
+                      </a:endParaRPr>
+                    </a:p>
+                  </a:txBody>
+                  <a:tcPr marL="82586" marR="82586" marT="41293" marB="41293"/>
+                </a:tc>
+                <a:tc>
+                  <a:txBody>
+                    <a:bodyPr/>
+                    <a:lstStyle/>
+                    <a:p>
+                      <a:r>
+                        <a:rPr lang="en-US" altLang="zh-CN" sz="1300" dirty="0">
+                          <a:latin typeface="Calibri" panose="020F0502020204030204" pitchFamily="34" charset="0"/>
+                          <a:cs typeface="Calibri" panose="020F0502020204030204" pitchFamily="34" charset="0"/>
+                        </a:rPr>
+                        <a:t>-0.800</a:t>
+                      </a:r>
+                      <a:endParaRPr lang="zh-CN" altLang="en-US" sz="1300" dirty="0">
+                        <a:latin typeface="Calibri" panose="020F0502020204030204" pitchFamily="34" charset="0"/>
+                        <a:cs typeface="Calibri" panose="020F0502020204030204" pitchFamily="34" charset="0"/>
+                      </a:endParaRPr>
+                    </a:p>
+                  </a:txBody>
+                  <a:tcPr marL="82586" marR="82586" marT="41293" marB="41293"/>
+                </a:tc>
+                <a:tc>
+                  <a:txBody>
+                    <a:bodyPr/>
+                    <a:lstStyle/>
+                    <a:p>
+                      <a:r>
+                        <a:rPr lang="en-US" altLang="zh-CN" sz="1300" dirty="0">
+                          <a:latin typeface="Calibri" panose="020F0502020204030204" pitchFamily="34" charset="0"/>
+                          <a:cs typeface="Calibri" panose="020F0502020204030204" pitchFamily="34" charset="0"/>
+                        </a:rPr>
+                        <a:t>4.5</a:t>
+                      </a:r>
+                      <a:endParaRPr lang="zh-CN" altLang="en-US" sz="1300" dirty="0">
+                        <a:latin typeface="Calibri" panose="020F0502020204030204" pitchFamily="34" charset="0"/>
+                        <a:cs typeface="Calibri" panose="020F0502020204030204" pitchFamily="34" charset="0"/>
+                      </a:endParaRPr>
+                    </a:p>
+                  </a:txBody>
+                  <a:tcPr marL="82586" marR="82586" marT="41293" marB="41293"/>
+                </a:tc>
+                <a:tc>
+                  <a:txBody>
+                    <a:bodyPr/>
+                    <a:lstStyle/>
+                    <a:p>
+                      <a:r>
+                        <a:rPr lang="en-US" altLang="zh-CN" sz="1300" dirty="0">
+                          <a:latin typeface="Calibri" panose="020F0502020204030204" pitchFamily="34" charset="0"/>
+                          <a:cs typeface="Calibri" panose="020F0502020204030204" pitchFamily="34" charset="0"/>
+                        </a:rPr>
+                        <a:t>0.25</a:t>
+                      </a:r>
+                      <a:endParaRPr lang="zh-CN" altLang="en-US" sz="1300" dirty="0">
+                        <a:latin typeface="Calibri" panose="020F0502020204030204" pitchFamily="34" charset="0"/>
+                        <a:cs typeface="Calibri" panose="020F0502020204030204" pitchFamily="34" charset="0"/>
+                      </a:endParaRPr>
+                    </a:p>
+                  </a:txBody>
+                  <a:tcPr marL="82586" marR="82586" marT="41293" marB="41293"/>
+                </a:tc>
+                <a:extLst>
+                  <a:ext uri="{0D108BD9-81ED-4DB2-BD59-A6C34878D82A}">
+                    <a16:rowId xmlns:a16="http://schemas.microsoft.com/office/drawing/2014/main" val="3901734677"/>
+                  </a:ext>
+                </a:extLst>
+              </a:tr>
+              <a:tr h="275286">
+                <a:tc>
+                  <a:txBody>
+                    <a:bodyPr/>
+                    <a:lstStyle/>
+                    <a:p>
+                      <a:r>
+                        <a:rPr lang="en-US" altLang="zh-CN" sz="1300" dirty="0">
+                          <a:latin typeface="Calibri" panose="020F0502020204030204" pitchFamily="34" charset="0"/>
+                          <a:cs typeface="Calibri" panose="020F0502020204030204" pitchFamily="34" charset="0"/>
+                        </a:rPr>
+                        <a:t>20*20</a:t>
+                      </a:r>
+                      <a:endParaRPr lang="zh-CN" altLang="en-US" sz="1300" dirty="0">
+                        <a:latin typeface="Calibri" panose="020F0502020204030204" pitchFamily="34" charset="0"/>
+                        <a:cs typeface="Calibri" panose="020F0502020204030204" pitchFamily="34" charset="0"/>
+                      </a:endParaRPr>
+                    </a:p>
+                  </a:txBody>
+                  <a:tcPr marL="82586" marR="82586" marT="41293" marB="41293"/>
+                </a:tc>
+                <a:tc>
+                  <a:txBody>
+                    <a:bodyPr/>
+                    <a:lstStyle/>
+                    <a:p>
+                      <a:r>
+                        <a:rPr lang="en-US" altLang="zh-CN" sz="1300" dirty="0">
+                          <a:latin typeface="Calibri" panose="020F0502020204030204" pitchFamily="34" charset="0"/>
+                          <a:cs typeface="Calibri" panose="020F0502020204030204" pitchFamily="34" charset="0"/>
+                        </a:rPr>
+                        <a:t>1.25</a:t>
+                      </a:r>
+                      <a:endParaRPr lang="zh-CN" altLang="en-US" sz="1300" dirty="0">
+                        <a:latin typeface="Calibri" panose="020F0502020204030204" pitchFamily="34" charset="0"/>
+                        <a:cs typeface="Calibri" panose="020F0502020204030204" pitchFamily="34" charset="0"/>
+                      </a:endParaRPr>
+                    </a:p>
+                  </a:txBody>
+                  <a:tcPr marL="82586" marR="82586" marT="41293" marB="41293"/>
+                </a:tc>
+                <a:tc>
+                  <a:txBody>
+                    <a:bodyPr/>
+                    <a:lstStyle/>
+                    <a:p>
+                      <a:r>
+                        <a:rPr lang="en-US" altLang="zh-CN" sz="1300" dirty="0">
+                          <a:latin typeface="Calibri" panose="020F0502020204030204" pitchFamily="34" charset="0"/>
+                          <a:cs typeface="Calibri" panose="020F0502020204030204" pitchFamily="34" charset="0"/>
+                        </a:rPr>
+                        <a:t>-1.133</a:t>
+                      </a:r>
+                      <a:endParaRPr lang="zh-CN" altLang="en-US" sz="1300" dirty="0">
+                        <a:latin typeface="Calibri" panose="020F0502020204030204" pitchFamily="34" charset="0"/>
+                        <a:cs typeface="Calibri" panose="020F0502020204030204" pitchFamily="34" charset="0"/>
+                      </a:endParaRPr>
+                    </a:p>
+                  </a:txBody>
+                  <a:tcPr marL="82586" marR="82586" marT="41293" marB="41293"/>
+                </a:tc>
+                <a:tc>
+                  <a:txBody>
+                    <a:bodyPr/>
+                    <a:lstStyle/>
+                    <a:p>
+                      <a:r>
+                        <a:rPr lang="en-US" altLang="zh-CN" sz="1300" dirty="0">
+                          <a:latin typeface="Calibri" panose="020F0502020204030204" pitchFamily="34" charset="0"/>
+                          <a:cs typeface="Calibri" panose="020F0502020204030204" pitchFamily="34" charset="0"/>
+                        </a:rPr>
+                        <a:t>1.50</a:t>
+                      </a:r>
+                      <a:endParaRPr lang="zh-CN" altLang="en-US" sz="1300" dirty="0">
+                        <a:latin typeface="Calibri" panose="020F0502020204030204" pitchFamily="34" charset="0"/>
+                        <a:cs typeface="Calibri" panose="020F0502020204030204" pitchFamily="34" charset="0"/>
+                      </a:endParaRPr>
+                    </a:p>
+                  </a:txBody>
+                  <a:tcPr marL="82586" marR="82586" marT="41293" marB="41293"/>
+                </a:tc>
+                <a:tc>
+                  <a:txBody>
+                    <a:bodyPr/>
+                    <a:lstStyle/>
+                    <a:p>
+                      <a:r>
+                        <a:rPr lang="en-US" altLang="zh-CN" sz="1300" dirty="0">
+                          <a:latin typeface="Calibri" panose="020F0502020204030204" pitchFamily="34" charset="0"/>
+                          <a:cs typeface="Calibri" panose="020F0502020204030204" pitchFamily="34" charset="0"/>
+                        </a:rPr>
+                        <a:t>0.23</a:t>
+                      </a:r>
+                      <a:endParaRPr lang="zh-CN" altLang="en-US" sz="1300" dirty="0">
+                        <a:latin typeface="Calibri" panose="020F0502020204030204" pitchFamily="34" charset="0"/>
+                        <a:cs typeface="Calibri" panose="020F0502020204030204" pitchFamily="34" charset="0"/>
+                      </a:endParaRPr>
+                    </a:p>
+                  </a:txBody>
+                  <a:tcPr marL="82586" marR="82586" marT="41293" marB="41293"/>
+                </a:tc>
+                <a:extLst>
+                  <a:ext uri="{0D108BD9-81ED-4DB2-BD59-A6C34878D82A}">
+                    <a16:rowId xmlns:a16="http://schemas.microsoft.com/office/drawing/2014/main" val="3716399231"/>
+                  </a:ext>
+                </a:extLst>
+              </a:tr>
+              <a:tr h="275286">
+                <a:tc>
+                  <a:txBody>
+                    <a:bodyPr/>
+                    <a:lstStyle/>
+                    <a:p>
+                      <a:r>
+                        <a:rPr lang="en-US" altLang="zh-CN" sz="1300" dirty="0">
+                          <a:latin typeface="Calibri" panose="020F0502020204030204" pitchFamily="34" charset="0"/>
+                          <a:cs typeface="Calibri" panose="020F0502020204030204" pitchFamily="34" charset="0"/>
+                        </a:rPr>
+                        <a:t>30*30</a:t>
+                      </a:r>
+                      <a:endParaRPr lang="zh-CN" altLang="en-US" sz="1300" dirty="0">
+                        <a:latin typeface="Calibri" panose="020F0502020204030204" pitchFamily="34" charset="0"/>
+                        <a:cs typeface="Calibri" panose="020F0502020204030204" pitchFamily="34" charset="0"/>
+                      </a:endParaRPr>
+                    </a:p>
+                  </a:txBody>
+                  <a:tcPr marL="82586" marR="82586" marT="41293" marB="41293"/>
+                </a:tc>
+                <a:tc>
+                  <a:txBody>
+                    <a:bodyPr/>
+                    <a:lstStyle/>
+                    <a:p>
+                      <a:r>
+                        <a:rPr lang="en-US" altLang="zh-CN" sz="1300" dirty="0">
+                          <a:latin typeface="Calibri" panose="020F0502020204030204" pitchFamily="34" charset="0"/>
+                          <a:cs typeface="Calibri" panose="020F0502020204030204" pitchFamily="34" charset="0"/>
+                        </a:rPr>
+                        <a:t>0.75</a:t>
+                      </a:r>
+                      <a:endParaRPr lang="zh-CN" altLang="en-US" sz="1300" dirty="0">
+                        <a:latin typeface="Calibri" panose="020F0502020204030204" pitchFamily="34" charset="0"/>
+                        <a:cs typeface="Calibri" panose="020F0502020204030204" pitchFamily="34" charset="0"/>
+                      </a:endParaRPr>
+                    </a:p>
+                  </a:txBody>
+                  <a:tcPr marL="82586" marR="82586" marT="41293" marB="41293"/>
+                </a:tc>
+                <a:tc>
+                  <a:txBody>
+                    <a:bodyPr/>
+                    <a:lstStyle/>
+                    <a:p>
+                      <a:r>
+                        <a:rPr lang="en-US" altLang="zh-CN" sz="1300" dirty="0">
+                          <a:latin typeface="Calibri" panose="020F0502020204030204" pitchFamily="34" charset="0"/>
+                          <a:cs typeface="Calibri" panose="020F0502020204030204" pitchFamily="34" charset="0"/>
+                        </a:rPr>
+                        <a:t>-0.800</a:t>
+                      </a:r>
+                      <a:endParaRPr lang="zh-CN" altLang="en-US" sz="1300" dirty="0">
+                        <a:latin typeface="Calibri" panose="020F0502020204030204" pitchFamily="34" charset="0"/>
+                        <a:cs typeface="Calibri" panose="020F0502020204030204" pitchFamily="34" charset="0"/>
+                      </a:endParaRPr>
+                    </a:p>
+                  </a:txBody>
+                  <a:tcPr marL="82586" marR="82586" marT="41293" marB="41293"/>
+                </a:tc>
+                <a:tc>
+                  <a:txBody>
+                    <a:bodyPr/>
+                    <a:lstStyle/>
+                    <a:p>
+                      <a:r>
+                        <a:rPr lang="en-US" altLang="zh-CN" sz="1300" dirty="0">
+                          <a:latin typeface="Calibri" panose="020F0502020204030204" pitchFamily="34" charset="0"/>
+                          <a:cs typeface="Calibri" panose="020F0502020204030204" pitchFamily="34" charset="0"/>
+                        </a:rPr>
+                        <a:t>1.00</a:t>
+                      </a:r>
+                      <a:endParaRPr lang="zh-CN" altLang="en-US" sz="1300" dirty="0">
+                        <a:latin typeface="Calibri" panose="020F0502020204030204" pitchFamily="34" charset="0"/>
+                        <a:cs typeface="Calibri" panose="020F0502020204030204" pitchFamily="34" charset="0"/>
+                      </a:endParaRPr>
+                    </a:p>
+                  </a:txBody>
+                  <a:tcPr marL="82586" marR="82586" marT="41293" marB="41293"/>
+                </a:tc>
+                <a:tc>
+                  <a:txBody>
+                    <a:bodyPr/>
+                    <a:lstStyle/>
+                    <a:p>
+                      <a:r>
+                        <a:rPr lang="en-US" altLang="zh-CN" sz="1300" dirty="0">
+                          <a:latin typeface="Calibri" panose="020F0502020204030204" pitchFamily="34" charset="0"/>
+                          <a:cs typeface="Calibri" panose="020F0502020204030204" pitchFamily="34" charset="0"/>
+                        </a:rPr>
+                        <a:t>0.24</a:t>
+                      </a:r>
+                      <a:endParaRPr lang="zh-CN" altLang="en-US" sz="1300" dirty="0">
+                        <a:latin typeface="Calibri" panose="020F0502020204030204" pitchFamily="34" charset="0"/>
+                        <a:cs typeface="Calibri" panose="020F0502020204030204" pitchFamily="34" charset="0"/>
+                      </a:endParaRPr>
+                    </a:p>
+                  </a:txBody>
+                  <a:tcPr marL="82586" marR="82586" marT="41293" marB="41293"/>
+                </a:tc>
+                <a:extLst>
+                  <a:ext uri="{0D108BD9-81ED-4DB2-BD59-A6C34878D82A}">
+                    <a16:rowId xmlns:a16="http://schemas.microsoft.com/office/drawing/2014/main" val="5113492"/>
+                  </a:ext>
+                </a:extLst>
+              </a:tr>
+            </a:tbl>
+          </a:graphicData>
+        </a:graphic>
+      </p:graphicFrame>
+      <p:sp>
+        <p:nvSpPr>
+          <p:cNvPr id="5" name="文本框 4">
+            <a:extLst>
+              <a:ext uri="{FF2B5EF4-FFF2-40B4-BE49-F238E27FC236}">
+                <a16:creationId xmlns:a16="http://schemas.microsoft.com/office/drawing/2014/main" id="{17CB7252-0243-8C2F-78AA-7FCC4081CBF1}"/>
+              </a:ext>
+            </a:extLst>
+          </p:cNvPr>
+          <p:cNvSpPr txBox="1"/>
+          <p:nvPr/>
+        </p:nvSpPr>
+        <p:spPr>
+          <a:xfrm>
+            <a:off x="9417687" y="5359340"/>
+            <a:ext cx="3860800" cy="369332"/>
+          </a:xfrm>
+          <a:prstGeom prst="rect">
+            <a:avLst/>
+          </a:prstGeom>
+          <a:noFill/>
+        </p:spPr>
+        <p:txBody>
+          <a:bodyPr wrap="square" rtlCol="0">
+            <a:spAutoFit/>
+          </a:bodyPr>
+          <a:lstStyle/>
+          <a:p>
+            <a:r>
+              <a:rPr kumimoji="1" lang="en-US" altLang="zh-CN" dirty="0">
+                <a:latin typeface="Calibri" panose="020F0502020204030204" pitchFamily="34" charset="0"/>
+                <a:cs typeface="Calibri" panose="020F0502020204030204" pitchFamily="34" charset="0"/>
+              </a:rPr>
+              <a:t>Fluctuation diagnostic</a:t>
+            </a:r>
+            <a:endParaRPr kumimoji="1" lang="zh-CN" altLang="en-US" dirty="0">
+              <a:latin typeface="Calibri" panose="020F0502020204030204" pitchFamily="34" charset="0"/>
+              <a:cs typeface="Calibri" panose="020F0502020204030204" pitchFamily="34" charset="0"/>
+            </a:endParaRPr>
+          </a:p>
+        </p:txBody>
+      </p:sp>
+      <p:pic>
+        <p:nvPicPr>
+          <p:cNvPr id="6" name="图片 5">
+            <a:extLst>
+              <a:ext uri="{FF2B5EF4-FFF2-40B4-BE49-F238E27FC236}">
+                <a16:creationId xmlns:a16="http://schemas.microsoft.com/office/drawing/2014/main" id="{960038AB-31D0-ABEC-BB2A-499522E81696}"/>
+              </a:ext>
+            </a:extLst>
+          </p:cNvPr>
+          <p:cNvPicPr>
+            <a:picLocks noChangeAspect="1"/>
+          </p:cNvPicPr>
+          <p:nvPr/>
+        </p:nvPicPr>
+        <p:blipFill>
+          <a:blip r:embed="rId3"/>
+          <a:stretch>
+            <a:fillRect/>
+          </a:stretch>
+        </p:blipFill>
+        <p:spPr>
+          <a:xfrm>
+            <a:off x="9417687" y="4749740"/>
+            <a:ext cx="2374900" cy="609600"/>
+          </a:xfrm>
+          <a:prstGeom prst="rect">
+            <a:avLst/>
+          </a:prstGeom>
+        </p:spPr>
+      </p:pic>
+      <p:graphicFrame>
+        <p:nvGraphicFramePr>
+          <p:cNvPr id="7" name="表格 6">
+            <a:extLst>
+              <a:ext uri="{FF2B5EF4-FFF2-40B4-BE49-F238E27FC236}">
+                <a16:creationId xmlns:a16="http://schemas.microsoft.com/office/drawing/2014/main" id="{EFF10241-2149-A41C-BE89-38A8324A5B4A}"/>
+              </a:ext>
+            </a:extLst>
+          </p:cNvPr>
+          <p:cNvGraphicFramePr>
+            <a:graphicFrameLocks noGrp="1"/>
+          </p:cNvGraphicFramePr>
+          <p:nvPr>
+            <p:extLst>
+              <p:ext uri="{D42A27DB-BD31-4B8C-83A1-F6EECF244321}">
+                <p14:modId xmlns:p14="http://schemas.microsoft.com/office/powerpoint/2010/main" val="2039370565"/>
+              </p:ext>
+            </p:extLst>
+          </p:nvPr>
+        </p:nvGraphicFramePr>
+        <p:xfrm>
+          <a:off x="2774313" y="5728672"/>
+          <a:ext cx="6515098" cy="1129328"/>
+        </p:xfrm>
+        <a:graphic>
+          <a:graphicData uri="http://schemas.openxmlformats.org/drawingml/2006/table">
+            <a:tbl>
+              <a:tblPr firstRow="1" bandRow="1">
+                <a:tableStyleId>{5C22544A-7EE6-4342-B048-85BDC9FD1C3A}</a:tableStyleId>
+              </a:tblPr>
+              <a:tblGrid>
+                <a:gridCol w="902642">
+                  <a:extLst>
+                    <a:ext uri="{9D8B030D-6E8A-4147-A177-3AD203B41FA5}">
+                      <a16:colId xmlns:a16="http://schemas.microsoft.com/office/drawing/2014/main" val="2569558677"/>
+                    </a:ext>
+                  </a:extLst>
+                </a:gridCol>
+                <a:gridCol w="1751659">
+                  <a:extLst>
+                    <a:ext uri="{9D8B030D-6E8A-4147-A177-3AD203B41FA5}">
+                      <a16:colId xmlns:a16="http://schemas.microsoft.com/office/drawing/2014/main" val="3125625566"/>
+                    </a:ext>
+                  </a:extLst>
+                </a:gridCol>
+                <a:gridCol w="1000947">
+                  <a:extLst>
+                    <a:ext uri="{9D8B030D-6E8A-4147-A177-3AD203B41FA5}">
+                      <a16:colId xmlns:a16="http://schemas.microsoft.com/office/drawing/2014/main" val="3489800992"/>
+                    </a:ext>
+                  </a:extLst>
+                </a:gridCol>
+                <a:gridCol w="1429925">
+                  <a:extLst>
+                    <a:ext uri="{9D8B030D-6E8A-4147-A177-3AD203B41FA5}">
+                      <a16:colId xmlns:a16="http://schemas.microsoft.com/office/drawing/2014/main" val="1805364633"/>
+                    </a:ext>
+                  </a:extLst>
+                </a:gridCol>
+                <a:gridCol w="1429925">
+                  <a:extLst>
+                    <a:ext uri="{9D8B030D-6E8A-4147-A177-3AD203B41FA5}">
+                      <a16:colId xmlns:a16="http://schemas.microsoft.com/office/drawing/2014/main" val="2271048523"/>
+                    </a:ext>
+                  </a:extLst>
+                </a:gridCol>
+              </a:tblGrid>
+              <a:tr h="280706">
+                <a:tc>
+                  <a:txBody>
+                    <a:bodyPr/>
+                    <a:lstStyle/>
+                    <a:p>
+                      <a:r>
+                        <a:rPr lang="en-US" altLang="zh-CN" sz="1300" dirty="0">
+                          <a:latin typeface="Calibri" panose="020F0502020204030204" pitchFamily="34" charset="0"/>
+                          <a:cs typeface="Calibri" panose="020F0502020204030204" pitchFamily="34" charset="0"/>
+                        </a:rPr>
+                        <a:t>WS</a:t>
+                      </a:r>
+                      <a:endParaRPr lang="zh-CN" altLang="en-US" sz="1300" dirty="0">
+                        <a:latin typeface="Calibri" panose="020F0502020204030204" pitchFamily="34" charset="0"/>
+                        <a:cs typeface="Calibri" panose="020F0502020204030204" pitchFamily="34" charset="0"/>
+                      </a:endParaRPr>
+                    </a:p>
+                  </a:txBody>
+                  <a:tcPr marL="84212" marR="84212" marT="42106" marB="42106"/>
+                </a:tc>
+                <a:tc>
+                  <a:txBody>
+                    <a:bodyPr/>
+                    <a:lstStyle/>
+                    <a:p>
+                      <a:pPr marL="0" algn="l" defTabSz="914400" rtl="0" eaLnBrk="1" latinLnBrk="0" hangingPunct="1"/>
+                      <a:r>
+                        <a:rPr lang="en-US" altLang="zh-CN" sz="1300" b="1" kern="1200" dirty="0">
+                          <a:solidFill>
+                            <a:schemeClr val="lt1"/>
+                          </a:solidFill>
+                          <a:latin typeface="Calibri" panose="020F0502020204030204" pitchFamily="34" charset="0"/>
+                          <a:ea typeface="+mn-ea"/>
+                          <a:cs typeface="Calibri" panose="020F0502020204030204" pitchFamily="34" charset="0"/>
+                        </a:rPr>
+                        <a:t>beta*(max |</a:t>
+                      </a:r>
+                      <a:r>
+                        <a:rPr lang="en-US" altLang="zh-CN" sz="1300" b="1" kern="1200" dirty="0" err="1">
+                          <a:solidFill>
+                            <a:schemeClr val="lt1"/>
+                          </a:solidFill>
+                          <a:latin typeface="Calibri" panose="020F0502020204030204" pitchFamily="34" charset="0"/>
+                          <a:ea typeface="+mn-ea"/>
+                          <a:cs typeface="Calibri" panose="020F0502020204030204" pitchFamily="34" charset="0"/>
+                        </a:rPr>
+                        <a:t>dPr-allD</a:t>
+                      </a:r>
+                      <a:r>
+                        <a:rPr lang="en-US" altLang="zh-CN" sz="1300" b="1" kern="1200" dirty="0">
+                          <a:solidFill>
+                            <a:schemeClr val="lt1"/>
+                          </a:solidFill>
+                          <a:latin typeface="Calibri" panose="020F0502020204030204" pitchFamily="34" charset="0"/>
+                          <a:ea typeface="+mn-ea"/>
+                          <a:cs typeface="Calibri" panose="020F0502020204030204" pitchFamily="34" charset="0"/>
+                        </a:rPr>
+                        <a:t>|)</a:t>
+                      </a:r>
+                      <a:endParaRPr lang="zh-CN" altLang="en-US" sz="1300" b="1" kern="1200" dirty="0">
+                        <a:solidFill>
+                          <a:schemeClr val="lt1"/>
+                        </a:solidFill>
+                        <a:latin typeface="Calibri" panose="020F0502020204030204" pitchFamily="34" charset="0"/>
+                        <a:ea typeface="+mn-ea"/>
+                        <a:cs typeface="Calibri" panose="020F0502020204030204" pitchFamily="34" charset="0"/>
+                      </a:endParaRPr>
+                    </a:p>
+                  </a:txBody>
+                  <a:tcPr marL="84212" marR="84212" marT="42106" marB="42106"/>
+                </a:tc>
+                <a:tc>
+                  <a:txBody>
+                    <a:bodyPr/>
+                    <a:lstStyle/>
+                    <a:p>
+                      <a:r>
+                        <a:rPr lang="en-US" altLang="zh-CN" sz="1300" dirty="0">
+                          <a:latin typeface="Calibri" panose="020F0502020204030204" pitchFamily="34" charset="0"/>
+                          <a:cs typeface="Calibri" panose="020F0502020204030204" pitchFamily="34" charset="0"/>
+                        </a:rPr>
+                        <a:t>max slope</a:t>
+                      </a:r>
+                      <a:endParaRPr lang="zh-CN" altLang="en-US" sz="1300" dirty="0">
+                        <a:latin typeface="Calibri" panose="020F0502020204030204" pitchFamily="34" charset="0"/>
+                        <a:cs typeface="Calibri" panose="020F0502020204030204" pitchFamily="34" charset="0"/>
+                      </a:endParaRPr>
+                    </a:p>
+                  </a:txBody>
+                  <a:tcPr marL="84212" marR="84212" marT="42106" marB="42106"/>
+                </a:tc>
+                <a:tc>
+                  <a:txBody>
+                    <a:bodyPr/>
+                    <a:lstStyle/>
+                    <a:p>
+                      <a:r>
+                        <a:rPr lang="en-US" altLang="zh-CN" sz="1300" b="1" kern="1200" dirty="0">
+                          <a:solidFill>
+                            <a:schemeClr val="lt1"/>
+                          </a:solidFill>
+                          <a:latin typeface="Calibri" panose="020F0502020204030204" pitchFamily="34" charset="0"/>
+                          <a:ea typeface="+mn-ea"/>
+                          <a:cs typeface="Calibri" panose="020F0502020204030204" pitchFamily="34" charset="0"/>
+                        </a:rPr>
+                        <a:t>beta*(max </a:t>
+                      </a:r>
+                      <a:r>
+                        <a:rPr lang="en-US" altLang="zh-CN" sz="1300" b="1" kern="1200" dirty="0" err="1">
+                          <a:solidFill>
+                            <a:schemeClr val="lt1"/>
+                          </a:solidFill>
+                          <a:latin typeface="Calibri" panose="020F0502020204030204" pitchFamily="34" charset="0"/>
+                          <a:ea typeface="+mn-ea"/>
+                          <a:cs typeface="Calibri" panose="020F0502020204030204" pitchFamily="34" charset="0"/>
+                        </a:rPr>
+                        <a:t>chiD</a:t>
+                      </a:r>
+                      <a:r>
+                        <a:rPr lang="en-US" altLang="zh-CN" sz="1300" b="1" kern="1200" dirty="0">
+                          <a:solidFill>
+                            <a:schemeClr val="lt1"/>
+                          </a:solidFill>
+                          <a:latin typeface="Calibri" panose="020F0502020204030204" pitchFamily="34" charset="0"/>
+                          <a:ea typeface="+mn-ea"/>
+                          <a:cs typeface="Calibri" panose="020F0502020204030204" pitchFamily="34" charset="0"/>
+                        </a:rPr>
+                        <a:t>)</a:t>
+                      </a:r>
+                      <a:endParaRPr lang="zh-CN" altLang="en-US" sz="1300" b="1" kern="1200" dirty="0">
+                        <a:solidFill>
+                          <a:schemeClr val="lt1"/>
+                        </a:solidFill>
+                        <a:latin typeface="Calibri" panose="020F0502020204030204" pitchFamily="34" charset="0"/>
+                        <a:ea typeface="+mn-ea"/>
+                        <a:cs typeface="Calibri" panose="020F0502020204030204" pitchFamily="34" charset="0"/>
+                      </a:endParaRPr>
+                    </a:p>
+                  </a:txBody>
+                  <a:tcPr marL="84212" marR="84212" marT="42106" marB="42106"/>
+                </a:tc>
+                <a:tc>
+                  <a:txBody>
+                    <a:bodyPr/>
+                    <a:lstStyle/>
+                    <a:p>
+                      <a:pPr marL="0" algn="l" defTabSz="914400" rtl="0" eaLnBrk="1" latinLnBrk="0" hangingPunct="1"/>
+                      <a:r>
+                        <a:rPr lang="en-US" altLang="zh-CN" sz="1300" b="1" kern="1200" dirty="0" err="1">
+                          <a:solidFill>
+                            <a:schemeClr val="lt1"/>
+                          </a:solidFill>
+                          <a:latin typeface="Calibri" panose="020F0502020204030204" pitchFamily="34" charset="0"/>
+                          <a:ea typeface="+mn-ea"/>
+                          <a:cs typeface="Calibri" panose="020F0502020204030204" pitchFamily="34" charset="0"/>
+                        </a:rPr>
+                        <a:t>chiD</a:t>
+                      </a:r>
+                      <a:endParaRPr lang="zh-CN" altLang="en-US" sz="1300" b="1" kern="1200" dirty="0">
+                        <a:solidFill>
+                          <a:schemeClr val="lt1"/>
+                        </a:solidFill>
+                        <a:latin typeface="Calibri" panose="020F0502020204030204" pitchFamily="34" charset="0"/>
+                        <a:ea typeface="+mn-ea"/>
+                        <a:cs typeface="Calibri" panose="020F0502020204030204" pitchFamily="34" charset="0"/>
+                      </a:endParaRPr>
+                    </a:p>
+                  </a:txBody>
+                  <a:tcPr marL="84212" marR="84212" marT="42106" marB="42106"/>
+                </a:tc>
+                <a:extLst>
+                  <a:ext uri="{0D108BD9-81ED-4DB2-BD59-A6C34878D82A}">
+                    <a16:rowId xmlns:a16="http://schemas.microsoft.com/office/drawing/2014/main" val="2555554977"/>
+                  </a:ext>
+                </a:extLst>
+              </a:tr>
+              <a:tr h="280706">
+                <a:tc>
+                  <a:txBody>
+                    <a:bodyPr/>
+                    <a:lstStyle/>
+                    <a:p>
+                      <a:r>
+                        <a:rPr lang="en-US" altLang="zh-CN" sz="1300" dirty="0">
+                          <a:latin typeface="Calibri" panose="020F0502020204030204" pitchFamily="34" charset="0"/>
+                          <a:cs typeface="Calibri" panose="020F0502020204030204" pitchFamily="34" charset="0"/>
+                        </a:rPr>
+                        <a:t>N=100</a:t>
+                      </a:r>
+                      <a:endParaRPr lang="zh-CN" altLang="en-US" sz="1300" dirty="0">
+                        <a:latin typeface="Calibri" panose="020F0502020204030204" pitchFamily="34" charset="0"/>
+                        <a:cs typeface="Calibri" panose="020F0502020204030204" pitchFamily="34" charset="0"/>
+                      </a:endParaRPr>
+                    </a:p>
+                  </a:txBody>
+                  <a:tcPr marL="84212" marR="84212" marT="42106" marB="42106"/>
+                </a:tc>
+                <a:tc>
+                  <a:txBody>
+                    <a:bodyPr/>
+                    <a:lstStyle/>
+                    <a:p>
+                      <a:r>
+                        <a:rPr lang="en-US" altLang="zh-CN" sz="1300" dirty="0">
+                          <a:latin typeface="Calibri" panose="020F0502020204030204" pitchFamily="34" charset="0"/>
+                          <a:cs typeface="Calibri" panose="020F0502020204030204" pitchFamily="34" charset="0"/>
+                        </a:rPr>
+                        <a:t>2.75</a:t>
+                      </a:r>
+                      <a:endParaRPr lang="zh-CN" altLang="en-US" sz="1300" dirty="0">
+                        <a:latin typeface="Calibri" panose="020F0502020204030204" pitchFamily="34" charset="0"/>
+                        <a:cs typeface="Calibri" panose="020F0502020204030204" pitchFamily="34" charset="0"/>
+                      </a:endParaRPr>
+                    </a:p>
+                  </a:txBody>
+                  <a:tcPr marL="84212" marR="84212" marT="42106" marB="42106"/>
+                </a:tc>
+                <a:tc>
+                  <a:txBody>
+                    <a:bodyPr/>
+                    <a:lstStyle/>
+                    <a:p>
+                      <a:r>
+                        <a:rPr lang="en-US" altLang="zh-CN" sz="1300" dirty="0">
+                          <a:latin typeface="Calibri" panose="020F0502020204030204" pitchFamily="34" charset="0"/>
+                          <a:cs typeface="Calibri" panose="020F0502020204030204" pitchFamily="34" charset="0"/>
+                        </a:rPr>
+                        <a:t>-0.600</a:t>
+                      </a:r>
+                      <a:endParaRPr lang="zh-CN" altLang="en-US" sz="1300" dirty="0">
+                        <a:latin typeface="Calibri" panose="020F0502020204030204" pitchFamily="34" charset="0"/>
+                        <a:cs typeface="Calibri" panose="020F0502020204030204" pitchFamily="34" charset="0"/>
+                      </a:endParaRPr>
+                    </a:p>
+                  </a:txBody>
+                  <a:tcPr marL="84212" marR="84212" marT="42106" marB="42106"/>
+                </a:tc>
+                <a:tc>
+                  <a:txBody>
+                    <a:bodyPr/>
+                    <a:lstStyle/>
+                    <a:p>
+                      <a:r>
+                        <a:rPr lang="en-US" altLang="zh-CN" sz="1300" dirty="0">
+                          <a:latin typeface="Calibri" panose="020F0502020204030204" pitchFamily="34" charset="0"/>
+                          <a:cs typeface="Calibri" panose="020F0502020204030204" pitchFamily="34" charset="0"/>
+                        </a:rPr>
+                        <a:t>4.00</a:t>
+                      </a:r>
+                      <a:endParaRPr lang="zh-CN" altLang="en-US" sz="1300" dirty="0">
+                        <a:latin typeface="Calibri" panose="020F0502020204030204" pitchFamily="34" charset="0"/>
+                        <a:cs typeface="Calibri" panose="020F0502020204030204" pitchFamily="34" charset="0"/>
+                      </a:endParaRPr>
+                    </a:p>
+                  </a:txBody>
+                  <a:tcPr marL="84212" marR="84212" marT="42106" marB="42106"/>
+                </a:tc>
+                <a:tc>
+                  <a:txBody>
+                    <a:bodyPr/>
+                    <a:lstStyle/>
+                    <a:p>
+                      <a:r>
+                        <a:rPr lang="en-US" altLang="zh-CN" sz="1300" dirty="0">
+                          <a:latin typeface="Calibri" panose="020F0502020204030204" pitchFamily="34" charset="0"/>
+                          <a:cs typeface="Calibri" panose="020F0502020204030204" pitchFamily="34" charset="0"/>
+                        </a:rPr>
+                        <a:t>0.25</a:t>
+                      </a:r>
+                      <a:endParaRPr lang="zh-CN" altLang="en-US" sz="1300" dirty="0">
+                        <a:latin typeface="Calibri" panose="020F0502020204030204" pitchFamily="34" charset="0"/>
+                        <a:cs typeface="Calibri" panose="020F0502020204030204" pitchFamily="34" charset="0"/>
+                      </a:endParaRPr>
+                    </a:p>
+                  </a:txBody>
+                  <a:tcPr marL="84212" marR="84212" marT="42106" marB="42106"/>
+                </a:tc>
+                <a:extLst>
+                  <a:ext uri="{0D108BD9-81ED-4DB2-BD59-A6C34878D82A}">
+                    <a16:rowId xmlns:a16="http://schemas.microsoft.com/office/drawing/2014/main" val="3901734677"/>
+                  </a:ext>
+                </a:extLst>
+              </a:tr>
+              <a:tr h="280706">
+                <a:tc>
+                  <a:txBody>
+                    <a:bodyPr/>
+                    <a:lstStyle/>
+                    <a:p>
+                      <a:r>
+                        <a:rPr lang="en-US" altLang="zh-CN" sz="1300" dirty="0">
+                          <a:latin typeface="Calibri" panose="020F0502020204030204" pitchFamily="34" charset="0"/>
+                          <a:cs typeface="Calibri" panose="020F0502020204030204" pitchFamily="34" charset="0"/>
+                        </a:rPr>
+                        <a:t>N=400</a:t>
+                      </a:r>
+                      <a:endParaRPr lang="zh-CN" altLang="en-US" sz="1300" dirty="0">
+                        <a:latin typeface="Calibri" panose="020F0502020204030204" pitchFamily="34" charset="0"/>
+                        <a:cs typeface="Calibri" panose="020F0502020204030204" pitchFamily="34" charset="0"/>
+                      </a:endParaRPr>
+                    </a:p>
+                  </a:txBody>
+                  <a:tcPr marL="84212" marR="84212" marT="42106" marB="42106"/>
+                </a:tc>
+                <a:tc>
+                  <a:txBody>
+                    <a:bodyPr/>
+                    <a:lstStyle/>
+                    <a:p>
+                      <a:r>
+                        <a:rPr lang="en-US" altLang="zh-CN" sz="1300" dirty="0">
+                          <a:latin typeface="Calibri" panose="020F0502020204030204" pitchFamily="34" charset="0"/>
+                          <a:cs typeface="Calibri" panose="020F0502020204030204" pitchFamily="34" charset="0"/>
+                        </a:rPr>
+                        <a:t>0.75</a:t>
+                      </a:r>
+                      <a:endParaRPr lang="zh-CN" altLang="en-US" sz="1300" dirty="0">
+                        <a:latin typeface="Calibri" panose="020F0502020204030204" pitchFamily="34" charset="0"/>
+                        <a:cs typeface="Calibri" panose="020F0502020204030204" pitchFamily="34" charset="0"/>
+                      </a:endParaRPr>
+                    </a:p>
+                  </a:txBody>
+                  <a:tcPr marL="84212" marR="84212" marT="42106" marB="42106"/>
+                </a:tc>
+                <a:tc>
+                  <a:txBody>
+                    <a:bodyPr/>
+                    <a:lstStyle/>
+                    <a:p>
+                      <a:r>
+                        <a:rPr lang="en-US" altLang="zh-CN" sz="1300" dirty="0">
+                          <a:latin typeface="Calibri" panose="020F0502020204030204" pitchFamily="34" charset="0"/>
+                          <a:cs typeface="Calibri" panose="020F0502020204030204" pitchFamily="34" charset="0"/>
+                        </a:rPr>
+                        <a:t>-1.000</a:t>
+                      </a:r>
+                      <a:endParaRPr lang="zh-CN" altLang="en-US" sz="1300" dirty="0">
+                        <a:latin typeface="Calibri" panose="020F0502020204030204" pitchFamily="34" charset="0"/>
+                        <a:cs typeface="Calibri" panose="020F0502020204030204" pitchFamily="34" charset="0"/>
+                      </a:endParaRPr>
+                    </a:p>
+                  </a:txBody>
+                  <a:tcPr marL="84212" marR="84212" marT="42106" marB="42106"/>
+                </a:tc>
+                <a:tc>
+                  <a:txBody>
+                    <a:bodyPr/>
+                    <a:lstStyle/>
+                    <a:p>
+                      <a:r>
+                        <a:rPr lang="en-US" altLang="zh-CN" sz="1300" dirty="0">
+                          <a:latin typeface="Calibri" panose="020F0502020204030204" pitchFamily="34" charset="0"/>
+                          <a:cs typeface="Calibri" panose="020F0502020204030204" pitchFamily="34" charset="0"/>
+                        </a:rPr>
+                        <a:t>1.00</a:t>
+                      </a:r>
+                      <a:endParaRPr lang="zh-CN" altLang="en-US" sz="1300" dirty="0">
+                        <a:latin typeface="Calibri" panose="020F0502020204030204" pitchFamily="34" charset="0"/>
+                        <a:cs typeface="Calibri" panose="020F0502020204030204" pitchFamily="34" charset="0"/>
+                      </a:endParaRPr>
+                    </a:p>
+                  </a:txBody>
+                  <a:tcPr marL="84212" marR="84212" marT="42106" marB="42106"/>
+                </a:tc>
+                <a:tc>
+                  <a:txBody>
+                    <a:bodyPr/>
+                    <a:lstStyle/>
+                    <a:p>
+                      <a:r>
+                        <a:rPr lang="en-US" altLang="zh-CN" sz="1300" dirty="0">
+                          <a:latin typeface="Calibri" panose="020F0502020204030204" pitchFamily="34" charset="0"/>
+                          <a:cs typeface="Calibri" panose="020F0502020204030204" pitchFamily="34" charset="0"/>
+                        </a:rPr>
+                        <a:t>0.25</a:t>
+                      </a:r>
+                      <a:endParaRPr lang="zh-CN" altLang="en-US" sz="1300" dirty="0">
+                        <a:latin typeface="Calibri" panose="020F0502020204030204" pitchFamily="34" charset="0"/>
+                        <a:cs typeface="Calibri" panose="020F0502020204030204" pitchFamily="34" charset="0"/>
+                      </a:endParaRPr>
+                    </a:p>
+                  </a:txBody>
+                  <a:tcPr marL="84212" marR="84212" marT="42106" marB="42106"/>
+                </a:tc>
+                <a:extLst>
+                  <a:ext uri="{0D108BD9-81ED-4DB2-BD59-A6C34878D82A}">
+                    <a16:rowId xmlns:a16="http://schemas.microsoft.com/office/drawing/2014/main" val="3716399231"/>
+                  </a:ext>
+                </a:extLst>
+              </a:tr>
+              <a:tr h="280706">
+                <a:tc>
+                  <a:txBody>
+                    <a:bodyPr/>
+                    <a:lstStyle/>
+                    <a:p>
+                      <a:r>
+                        <a:rPr lang="en-US" altLang="zh-CN" sz="1300" dirty="0">
+                          <a:latin typeface="Calibri" panose="020F0502020204030204" pitchFamily="34" charset="0"/>
+                          <a:cs typeface="Calibri" panose="020F0502020204030204" pitchFamily="34" charset="0"/>
+                        </a:rPr>
+                        <a:t>N=900</a:t>
+                      </a:r>
+                      <a:endParaRPr lang="zh-CN" altLang="en-US" sz="1300" dirty="0">
+                        <a:latin typeface="Calibri" panose="020F0502020204030204" pitchFamily="34" charset="0"/>
+                        <a:cs typeface="Calibri" panose="020F0502020204030204" pitchFamily="34" charset="0"/>
+                      </a:endParaRPr>
+                    </a:p>
+                  </a:txBody>
+                  <a:tcPr marL="84212" marR="84212" marT="42106" marB="42106"/>
+                </a:tc>
+                <a:tc>
+                  <a:txBody>
+                    <a:bodyPr/>
+                    <a:lstStyle/>
+                    <a:p>
+                      <a:r>
+                        <a:rPr lang="en-US" altLang="zh-CN" sz="1300" dirty="0">
+                          <a:latin typeface="Calibri" panose="020F0502020204030204" pitchFamily="34" charset="0"/>
+                          <a:cs typeface="Calibri" panose="020F0502020204030204" pitchFamily="34" charset="0"/>
+                        </a:rPr>
+                        <a:t>0.75</a:t>
+                      </a:r>
+                      <a:endParaRPr lang="zh-CN" altLang="en-US" sz="1300" dirty="0">
+                        <a:latin typeface="Calibri" panose="020F0502020204030204" pitchFamily="34" charset="0"/>
+                        <a:cs typeface="Calibri" panose="020F0502020204030204" pitchFamily="34" charset="0"/>
+                      </a:endParaRPr>
+                    </a:p>
+                  </a:txBody>
+                  <a:tcPr marL="84212" marR="84212" marT="42106" marB="42106"/>
+                </a:tc>
+                <a:tc>
+                  <a:txBody>
+                    <a:bodyPr/>
+                    <a:lstStyle/>
+                    <a:p>
+                      <a:r>
+                        <a:rPr lang="en-US" altLang="zh-CN" sz="1300" dirty="0">
+                          <a:latin typeface="Calibri" panose="020F0502020204030204" pitchFamily="34" charset="0"/>
+                          <a:cs typeface="Calibri" panose="020F0502020204030204" pitchFamily="34" charset="0"/>
+                        </a:rPr>
+                        <a:t>-1.600</a:t>
+                      </a:r>
+                      <a:endParaRPr lang="zh-CN" altLang="en-US" sz="1300" dirty="0">
+                        <a:latin typeface="Calibri" panose="020F0502020204030204" pitchFamily="34" charset="0"/>
+                        <a:cs typeface="Calibri" panose="020F0502020204030204" pitchFamily="34" charset="0"/>
+                      </a:endParaRPr>
+                    </a:p>
+                  </a:txBody>
+                  <a:tcPr marL="84212" marR="84212" marT="42106" marB="42106"/>
+                </a:tc>
+                <a:tc>
+                  <a:txBody>
+                    <a:bodyPr/>
+                    <a:lstStyle/>
+                    <a:p>
+                      <a:r>
+                        <a:rPr lang="en-US" altLang="zh-CN" sz="1300" dirty="0">
+                          <a:latin typeface="Calibri" panose="020F0502020204030204" pitchFamily="34" charset="0"/>
+                          <a:cs typeface="Calibri" panose="020F0502020204030204" pitchFamily="34" charset="0"/>
+                        </a:rPr>
+                        <a:t>1.00</a:t>
+                      </a:r>
+                      <a:endParaRPr lang="zh-CN" altLang="en-US" sz="1300" dirty="0">
+                        <a:latin typeface="Calibri" panose="020F0502020204030204" pitchFamily="34" charset="0"/>
+                        <a:cs typeface="Calibri" panose="020F0502020204030204" pitchFamily="34" charset="0"/>
+                      </a:endParaRPr>
+                    </a:p>
+                  </a:txBody>
+                  <a:tcPr marL="84212" marR="84212" marT="42106" marB="42106"/>
+                </a:tc>
+                <a:tc>
+                  <a:txBody>
+                    <a:bodyPr/>
+                    <a:lstStyle/>
+                    <a:p>
+                      <a:r>
+                        <a:rPr lang="en-US" altLang="zh-CN" sz="1300" dirty="0">
+                          <a:latin typeface="Calibri" panose="020F0502020204030204" pitchFamily="34" charset="0"/>
+                          <a:cs typeface="Calibri" panose="020F0502020204030204" pitchFamily="34" charset="0"/>
+                        </a:rPr>
+                        <a:t>0.16</a:t>
+                      </a:r>
+                      <a:endParaRPr lang="zh-CN" altLang="en-US" sz="1300" dirty="0">
+                        <a:latin typeface="Calibri" panose="020F0502020204030204" pitchFamily="34" charset="0"/>
+                        <a:cs typeface="Calibri" panose="020F0502020204030204" pitchFamily="34" charset="0"/>
+                      </a:endParaRPr>
+                    </a:p>
+                  </a:txBody>
+                  <a:tcPr marL="84212" marR="84212" marT="42106" marB="42106"/>
+                </a:tc>
+                <a:extLst>
+                  <a:ext uri="{0D108BD9-81ED-4DB2-BD59-A6C34878D82A}">
+                    <a16:rowId xmlns:a16="http://schemas.microsoft.com/office/drawing/2014/main" val="5113492"/>
+                  </a:ext>
+                </a:extLst>
+              </a:tr>
+            </a:tbl>
+          </a:graphicData>
+        </a:graphic>
+      </p:graphicFrame>
+      <p:pic>
+        <p:nvPicPr>
+          <p:cNvPr id="9" name="图片 8">
+            <a:extLst>
+              <a:ext uri="{FF2B5EF4-FFF2-40B4-BE49-F238E27FC236}">
+                <a16:creationId xmlns:a16="http://schemas.microsoft.com/office/drawing/2014/main" id="{C7A5CD26-1B2C-508D-6EC6-4B585CBB905F}"/>
+              </a:ext>
+            </a:extLst>
+          </p:cNvPr>
+          <p:cNvPicPr>
+            <a:picLocks noChangeAspect="1"/>
+          </p:cNvPicPr>
+          <p:nvPr/>
+        </p:nvPicPr>
+        <p:blipFill rotWithShape="1">
+          <a:blip r:embed="rId4"/>
+          <a:srcRect t="16713"/>
+          <a:stretch/>
+        </p:blipFill>
+        <p:spPr>
+          <a:xfrm>
+            <a:off x="2558411" y="1483191"/>
+            <a:ext cx="6731000" cy="1506295"/>
+          </a:xfrm>
+          <a:prstGeom prst="rect">
+            <a:avLst/>
+          </a:prstGeom>
+        </p:spPr>
+      </p:pic>
+      <p:sp>
+        <p:nvSpPr>
+          <p:cNvPr id="10" name="文本框 9">
+            <a:extLst>
+              <a:ext uri="{FF2B5EF4-FFF2-40B4-BE49-F238E27FC236}">
+                <a16:creationId xmlns:a16="http://schemas.microsoft.com/office/drawing/2014/main" id="{CCC29814-0699-7782-D301-B7FA227AA569}"/>
+              </a:ext>
+            </a:extLst>
+          </p:cNvPr>
+          <p:cNvSpPr txBox="1"/>
+          <p:nvPr/>
+        </p:nvSpPr>
+        <p:spPr>
+          <a:xfrm>
+            <a:off x="254000" y="119179"/>
+            <a:ext cx="1168400" cy="369332"/>
+          </a:xfrm>
+          <a:prstGeom prst="rect">
+            <a:avLst/>
+          </a:prstGeom>
+          <a:noFill/>
+        </p:spPr>
+        <p:txBody>
+          <a:bodyPr wrap="square" rtlCol="0">
+            <a:spAutoFit/>
+          </a:bodyPr>
+          <a:lstStyle/>
+          <a:p>
+            <a:r>
+              <a:rPr kumimoji="1" lang="en-US" altLang="zh-CN" b="1" dirty="0">
+                <a:solidFill>
+                  <a:srgbClr val="0070C0"/>
+                </a:solidFill>
+                <a:latin typeface="Calibri" panose="020F0502020204030204" pitchFamily="34" charset="0"/>
+                <a:cs typeface="Calibri" panose="020F0502020204030204" pitchFamily="34" charset="0"/>
+              </a:rPr>
+              <a:t>Imitation</a:t>
+            </a:r>
+            <a:endParaRPr kumimoji="1" lang="zh-CN" altLang="en-US" b="1" dirty="0">
+              <a:solidFill>
+                <a:srgbClr val="0070C0"/>
+              </a:solidFill>
+              <a:latin typeface="Calibri" panose="020F0502020204030204" pitchFamily="34" charset="0"/>
+              <a:cs typeface="Calibri" panose="020F0502020204030204" pitchFamily="34" charset="0"/>
+            </a:endParaRPr>
+          </a:p>
+        </p:txBody>
+      </p:sp>
+      <p:pic>
+        <p:nvPicPr>
+          <p:cNvPr id="12" name="图片 11">
+            <a:extLst>
+              <a:ext uri="{FF2B5EF4-FFF2-40B4-BE49-F238E27FC236}">
+                <a16:creationId xmlns:a16="http://schemas.microsoft.com/office/drawing/2014/main" id="{DCCB507A-624B-7E28-6BFE-CDF67415256A}"/>
+              </a:ext>
+            </a:extLst>
+          </p:cNvPr>
+          <p:cNvPicPr>
+            <a:picLocks noChangeAspect="1"/>
+          </p:cNvPicPr>
+          <p:nvPr/>
+        </p:nvPicPr>
+        <p:blipFill rotWithShape="1">
+          <a:blip r:embed="rId5"/>
+          <a:srcRect t="16713"/>
+          <a:stretch/>
+        </p:blipFill>
+        <p:spPr>
+          <a:xfrm>
+            <a:off x="2558411" y="1032"/>
+            <a:ext cx="6731000" cy="1506295"/>
+          </a:xfrm>
+          <a:prstGeom prst="rect">
+            <a:avLst/>
+          </a:prstGeom>
+        </p:spPr>
+      </p:pic>
+      <p:pic>
+        <p:nvPicPr>
+          <p:cNvPr id="14" name="图片 13">
+            <a:extLst>
+              <a:ext uri="{FF2B5EF4-FFF2-40B4-BE49-F238E27FC236}">
+                <a16:creationId xmlns:a16="http://schemas.microsoft.com/office/drawing/2014/main" id="{105AFC6C-EAC2-59FD-B95D-98CBF55D99CC}"/>
+              </a:ext>
+            </a:extLst>
+          </p:cNvPr>
+          <p:cNvPicPr>
+            <a:picLocks noChangeAspect="1"/>
+          </p:cNvPicPr>
+          <p:nvPr/>
+        </p:nvPicPr>
+        <p:blipFill rotWithShape="1">
+          <a:blip r:embed="rId6"/>
+          <a:srcRect t="12846"/>
+          <a:stretch/>
+        </p:blipFill>
+        <p:spPr>
+          <a:xfrm>
+            <a:off x="2558411" y="2933889"/>
+            <a:ext cx="6731000" cy="1576222"/>
+          </a:xfrm>
+          <a:prstGeom prst="rect">
+            <a:avLst/>
+          </a:prstGeom>
+        </p:spPr>
+      </p:pic>
+    </p:spTree>
+    <p:extLst>
+      <p:ext uri="{BB962C8B-B14F-4D97-AF65-F5344CB8AC3E}">
+        <p14:creationId xmlns:p14="http://schemas.microsoft.com/office/powerpoint/2010/main" val="2873764617"/>
       </p:ext>
     </p:extLst>
   </p:cSld>

</xml_diff>